<commit_message>
Presentation edits in progress
</commit_message>
<xml_diff>
--- a/Final_Presentationv3.pptx
+++ b/Final_Presentationv3.pptx
@@ -128,6 +128,43 @@
     </p:ext>
   </p:extLst>
 </p:presentation>
+</file>
+
+<file path=ppt/revisionInfo.xml><?xml version="1.0" encoding="utf-8"?>
+<p1510:revInfo xmlns:a="http://schemas.openxmlformats.org/drawingml/2006/main" xmlns:r="http://schemas.openxmlformats.org/officeDocument/2006/relationships" xmlns:p1510="http://schemas.microsoft.com/office/powerpoint/2015/10/main">
+  <p1510:revLst>
+    <p1510:client id="{9BEC9702-0268-4001-A900-6538E8F2E83F}" v="821" dt="2021-10-28T01:47:58.918"/>
+  </p1510:revLst>
+</p1510:revInfo>
+</file>
+
+<file path=ppt/changesInfos/changesInfo1.xml><?xml version="1.0" encoding="utf-8"?>
+<pc:chgInfo xmlns:a="http://schemas.openxmlformats.org/drawingml/2006/main" xmlns:r="http://schemas.openxmlformats.org/officeDocument/2006/relationships" xmlns:ac="http://schemas.microsoft.com/office/drawing/2013/main/command" xmlns:pc="http://schemas.microsoft.com/office/powerpoint/2013/main/command">
+  <pc:docChgLst>
+    <pc:chgData name="Amelia Corea" userId="0f927ba03023ffb6" providerId="LiveId" clId="{9BEC9702-0268-4001-A900-6538E8F2E83F}"/>
+    <pc:docChg chg="modSld">
+      <pc:chgData name="Amelia Corea" userId="0f927ba03023ffb6" providerId="LiveId" clId="{9BEC9702-0268-4001-A900-6538E8F2E83F}" dt="2021-10-28T01:47:58.918" v="821" actId="20577"/>
+      <pc:docMkLst>
+        <pc:docMk/>
+      </pc:docMkLst>
+      <pc:sldChg chg="modSp mod">
+        <pc:chgData name="Amelia Corea" userId="0f927ba03023ffb6" providerId="LiveId" clId="{9BEC9702-0268-4001-A900-6538E8F2E83F}" dt="2021-10-28T01:47:58.918" v="821" actId="20577"/>
+        <pc:sldMkLst>
+          <pc:docMk/>
+          <pc:sldMk cId="3253689747" sldId="257"/>
+        </pc:sldMkLst>
+        <pc:graphicFrameChg chg="mod">
+          <ac:chgData name="Amelia Corea" userId="0f927ba03023ffb6" providerId="LiveId" clId="{9BEC9702-0268-4001-A900-6538E8F2E83F}" dt="2021-10-28T01:47:58.918" v="821" actId="20577"/>
+          <ac:graphicFrameMkLst>
+            <pc:docMk/>
+            <pc:sldMk cId="3253689747" sldId="257"/>
+            <ac:graphicFrameMk id="4" creationId="{8D4F1745-A55E-4835-88EB-BC637121B608}"/>
+          </ac:graphicFrameMkLst>
+        </pc:graphicFrameChg>
+      </pc:sldChg>
+    </pc:docChg>
+  </pc:docChgLst>
+</pc:chgInfo>
 </file>
 
 <file path=ppt/diagrams/colors1.xml><?xml version="1.0" encoding="utf-8"?>
@@ -1654,7 +1691,7 @@
               <a:ea typeface="Tahoma" panose="020B0604030504040204" pitchFamily="34" charset="0"/>
               <a:cs typeface="Tahoma" panose="020B0604030504040204" pitchFamily="34" charset="0"/>
             </a:rPr>
-            <a:t>What is the problem?</a:t>
+            <a:t>What are we trying to predict and answer with the machine learning model?</a:t>
           </a:r>
         </a:p>
       </dgm:t>
@@ -1689,12 +1726,12 @@
         <a:lstStyle/>
         <a:p>
           <a:r>
-            <a:rPr lang="en-US" sz="2000" dirty="0">
+            <a:rPr lang="en-US" sz="1600" dirty="0">
               <a:latin typeface="Tahoma" panose="020B0604030504040204" pitchFamily="34" charset="0"/>
               <a:ea typeface="Tahoma" panose="020B0604030504040204" pitchFamily="34" charset="0"/>
               <a:cs typeface="Tahoma" panose="020B0604030504040204" pitchFamily="34" charset="0"/>
             </a:rPr>
-            <a:t>All San Diego County children may not have equal opportunity to quality primary education</a:t>
+            <a:t>All San Diego County children may not have equal opportunity to quality primary education based on the population statistics in their neighborhoods. </a:t>
           </a:r>
         </a:p>
       </dgm:t>
@@ -1737,7 +1774,7 @@
               <a:ea typeface="Tahoma" panose="020B0604030504040204" pitchFamily="34" charset="0"/>
               <a:cs typeface="Tahoma" panose="020B0604030504040204" pitchFamily="34" charset="0"/>
             </a:rPr>
-            <a:t>Who has this problem?</a:t>
+            <a:t>What machine learning model was used?</a:t>
           </a:r>
         </a:p>
       </dgm:t>
@@ -1772,12 +1809,28 @@
         <a:lstStyle/>
         <a:p>
           <a:r>
-            <a:rPr lang="en-US" sz="2000" dirty="0">
+            <a:rPr lang="en-US" sz="1600" dirty="0">
               <a:latin typeface="Tahoma" panose="020B0604030504040204" pitchFamily="34" charset="0"/>
               <a:ea typeface="Tahoma" panose="020B0604030504040204" pitchFamily="34" charset="0"/>
               <a:cs typeface="Tahoma" panose="020B0604030504040204" pitchFamily="34" charset="0"/>
             </a:rPr>
-            <a:t>We intend to answer this question through data analysis &amp; visualization</a:t>
+            <a:t>We used the XXX model to show how crime statistics, median salary, post secondary education…</a:t>
+          </a:r>
+          <a:r>
+            <a:rPr lang="en-US" sz="1600">
+              <a:latin typeface="Tahoma" panose="020B0604030504040204" pitchFamily="34" charset="0"/>
+              <a:ea typeface="Tahoma" panose="020B0604030504040204" pitchFamily="34" charset="0"/>
+              <a:cs typeface="Tahoma" panose="020B0604030504040204" pitchFamily="34" charset="0"/>
+            </a:rPr>
+            <a:t>may affect </a:t>
+          </a:r>
+          <a:r>
+            <a:rPr lang="en-US" sz="1600" dirty="0">
+              <a:latin typeface="Tahoma" panose="020B0604030504040204" pitchFamily="34" charset="0"/>
+              <a:ea typeface="Tahoma" panose="020B0604030504040204" pitchFamily="34" charset="0"/>
+              <a:cs typeface="Tahoma" panose="020B0604030504040204" pitchFamily="34" charset="0"/>
+            </a:rPr>
+            <a:t>a school’s rating.</a:t>
           </a:r>
         </a:p>
       </dgm:t>
@@ -1820,7 +1873,7 @@
               <a:ea typeface="Tahoma" panose="020B0604030504040204" pitchFamily="34" charset="0"/>
               <a:cs typeface="Tahoma" panose="020B0604030504040204" pitchFamily="34" charset="0"/>
             </a:rPr>
-            <a:t>Why should this problem be solved?</a:t>
+            <a:t>What did we find and how could the model be used?</a:t>
           </a:r>
         </a:p>
       </dgm:t>
@@ -1855,12 +1908,12 @@
         <a:lstStyle/>
         <a:p>
           <a:r>
-            <a:rPr lang="en-US" sz="2000" dirty="0">
+            <a:rPr lang="en-US" sz="1400" dirty="0">
               <a:latin typeface="Tahoma" panose="020B0604030504040204" pitchFamily="34" charset="0"/>
               <a:ea typeface="Tahoma" panose="020B0604030504040204" pitchFamily="34" charset="0"/>
               <a:cs typeface="Tahoma" panose="020B0604030504040204" pitchFamily="34" charset="0"/>
             </a:rPr>
-            <a:t>Primary educational outcomes are strong indicators of future success</a:t>
+            <a:t>If the model is accurate the model could potentially be used in other regions or for education service agencies and districts to further examine what additional resources or funding may be needed. </a:t>
           </a:r>
         </a:p>
       </dgm:t>
@@ -1943,7 +1996,7 @@
               <a:ea typeface="Tahoma" panose="020B0604030504040204" pitchFamily="34" charset="0"/>
               <a:cs typeface="Tahoma" panose="020B0604030504040204" pitchFamily="34" charset="0"/>
             </a:rPr>
-            <a:t>If we can detect distinct patterns that show different educational outcomes for different population groups in San Diego County</a:t>
+            <a:t>If we can find an accurate model that predicts school ratings against our test data set.</a:t>
           </a:r>
         </a:p>
       </dgm:t>
@@ -2437,10 +2490,24 @@
     <dgm:pt modelId="{75982A97-8130-4E98-B82E-DB0953FC8B95}" type="parTrans" cxnId="{18DC796B-A12C-4933-9201-8D6EE300A2A0}">
       <dgm:prSet/>
       <dgm:spPr/>
+      <dgm:t>
+        <a:bodyPr/>
+        <a:lstStyle/>
+        <a:p>
+          <a:endParaRPr lang="en-US"/>
+        </a:p>
+      </dgm:t>
     </dgm:pt>
     <dgm:pt modelId="{5C6A8CA1-CB30-45D0-B9ED-3A3294BF0500}" type="sibTrans" cxnId="{18DC796B-A12C-4933-9201-8D6EE300A2A0}">
       <dgm:prSet/>
       <dgm:spPr/>
+      <dgm:t>
+        <a:bodyPr/>
+        <a:lstStyle/>
+        <a:p>
+          <a:endParaRPr lang="en-US"/>
+        </a:p>
+      </dgm:t>
     </dgm:pt>
     <dgm:pt modelId="{2AE9B789-FEE4-4EA5-BA4D-CE5E1FDDBB56}">
       <dgm:prSet phldrT="[Text]"/>
@@ -2467,10 +2534,24 @@
     <dgm:pt modelId="{85238600-29C2-44DB-BD00-1C7AFF99B7C0}" type="parTrans" cxnId="{9B5EF070-2208-4D48-B5EE-FD4380264929}">
       <dgm:prSet/>
       <dgm:spPr/>
+      <dgm:t>
+        <a:bodyPr/>
+        <a:lstStyle/>
+        <a:p>
+          <a:endParaRPr lang="en-US"/>
+        </a:p>
+      </dgm:t>
     </dgm:pt>
     <dgm:pt modelId="{1FBB97C2-178C-4D74-84BC-818F9449B037}" type="sibTrans" cxnId="{9B5EF070-2208-4D48-B5EE-FD4380264929}">
       <dgm:prSet/>
       <dgm:spPr/>
+      <dgm:t>
+        <a:bodyPr/>
+        <a:lstStyle/>
+        <a:p>
+          <a:endParaRPr lang="en-US"/>
+        </a:p>
+      </dgm:t>
     </dgm:pt>
     <dgm:pt modelId="{2326EA86-5B01-448D-B7F1-3E265923EA6A}">
       <dgm:prSet phldrT="[Text]"/>
@@ -2497,10 +2578,24 @@
     <dgm:pt modelId="{C918EDD0-D697-4AC8-B84A-C075A4D48F5E}" type="parTrans" cxnId="{23D6659A-C44A-45A3-A093-1B9804CF6E74}">
       <dgm:prSet/>
       <dgm:spPr/>
+      <dgm:t>
+        <a:bodyPr/>
+        <a:lstStyle/>
+        <a:p>
+          <a:endParaRPr lang="en-US"/>
+        </a:p>
+      </dgm:t>
     </dgm:pt>
     <dgm:pt modelId="{3D62CC48-B5DB-4CF7-8312-212DF6E8750F}" type="sibTrans" cxnId="{23D6659A-C44A-45A3-A093-1B9804CF6E74}">
       <dgm:prSet/>
       <dgm:spPr/>
+      <dgm:t>
+        <a:bodyPr/>
+        <a:lstStyle/>
+        <a:p>
+          <a:endParaRPr lang="en-US"/>
+        </a:p>
+      </dgm:t>
     </dgm:pt>
     <dgm:pt modelId="{6121824F-16C4-4C65-97D4-AE31C568557E}">
       <dgm:prSet phldrT="[Text]"/>
@@ -2527,10 +2622,24 @@
     <dgm:pt modelId="{3C6A4360-9C59-4EBC-A537-49DBF29E1BCF}" type="parTrans" cxnId="{DC2501F6-690F-45DC-8B69-6D2896F32FAC}">
       <dgm:prSet/>
       <dgm:spPr/>
+      <dgm:t>
+        <a:bodyPr/>
+        <a:lstStyle/>
+        <a:p>
+          <a:endParaRPr lang="en-US"/>
+        </a:p>
+      </dgm:t>
     </dgm:pt>
     <dgm:pt modelId="{B7BD3C6B-24FE-45A9-B58B-BC6814396649}" type="sibTrans" cxnId="{DC2501F6-690F-45DC-8B69-6D2896F32FAC}">
       <dgm:prSet/>
       <dgm:spPr/>
+      <dgm:t>
+        <a:bodyPr/>
+        <a:lstStyle/>
+        <a:p>
+          <a:endParaRPr lang="en-US"/>
+        </a:p>
+      </dgm:t>
     </dgm:pt>
     <dgm:pt modelId="{753AC111-015C-42D1-8ABB-9AB6F3785DBF}">
       <dgm:prSet phldrT="[Text]"/>
@@ -2557,10 +2666,24 @@
     <dgm:pt modelId="{5A327804-E5B5-4524-BDF8-43E89C648B4F}" type="parTrans" cxnId="{B4B90BC0-3B9A-402C-9AA5-2F91586FE0E8}">
       <dgm:prSet/>
       <dgm:spPr/>
+      <dgm:t>
+        <a:bodyPr/>
+        <a:lstStyle/>
+        <a:p>
+          <a:endParaRPr lang="en-US"/>
+        </a:p>
+      </dgm:t>
     </dgm:pt>
     <dgm:pt modelId="{FB7AA6DF-3B26-482A-A715-738D84538B54}" type="sibTrans" cxnId="{B4B90BC0-3B9A-402C-9AA5-2F91586FE0E8}">
       <dgm:prSet/>
       <dgm:spPr/>
+      <dgm:t>
+        <a:bodyPr/>
+        <a:lstStyle/>
+        <a:p>
+          <a:endParaRPr lang="en-US"/>
+        </a:p>
+      </dgm:t>
     </dgm:pt>
     <dgm:pt modelId="{F4E5C8CA-D853-4B86-A230-410812094866}">
       <dgm:prSet phldrT="[Text]"/>
@@ -2595,10 +2718,24 @@
     <dgm:pt modelId="{005594CA-99F2-432B-BF91-C42D348C511A}" type="parTrans" cxnId="{4A53605E-BF09-4751-86C8-19A28F4EFD0D}">
       <dgm:prSet/>
       <dgm:spPr/>
+      <dgm:t>
+        <a:bodyPr/>
+        <a:lstStyle/>
+        <a:p>
+          <a:endParaRPr lang="en-US"/>
+        </a:p>
+      </dgm:t>
     </dgm:pt>
     <dgm:pt modelId="{FDA1AF4B-23A8-4C87-945B-517631227F52}" type="sibTrans" cxnId="{4A53605E-BF09-4751-86C8-19A28F4EFD0D}">
       <dgm:prSet/>
       <dgm:spPr/>
+      <dgm:t>
+        <a:bodyPr/>
+        <a:lstStyle/>
+        <a:p>
+          <a:endParaRPr lang="en-US"/>
+        </a:p>
+      </dgm:t>
     </dgm:pt>
     <dgm:pt modelId="{2D5B933B-42F3-42B5-909C-385314E0D308}">
       <dgm:prSet phldrT="[Text]"/>
@@ -2630,10 +2767,24 @@
     <dgm:pt modelId="{7A9A6CE3-4967-4A84-92D1-1B3BA61CE2B6}" type="parTrans" cxnId="{F5DD56DD-6CAD-417C-BDD4-6C13842E15C2}">
       <dgm:prSet/>
       <dgm:spPr/>
+      <dgm:t>
+        <a:bodyPr/>
+        <a:lstStyle/>
+        <a:p>
+          <a:endParaRPr lang="en-US"/>
+        </a:p>
+      </dgm:t>
     </dgm:pt>
     <dgm:pt modelId="{F23233DB-EAE3-4491-887E-16969F1190F1}" type="sibTrans" cxnId="{F5DD56DD-6CAD-417C-BDD4-6C13842E15C2}">
       <dgm:prSet/>
       <dgm:spPr/>
+      <dgm:t>
+        <a:bodyPr/>
+        <a:lstStyle/>
+        <a:p>
+          <a:endParaRPr lang="en-US"/>
+        </a:p>
+      </dgm:t>
     </dgm:pt>
     <dgm:pt modelId="{658E7E1C-C938-4112-884D-828D3980BD39}">
       <dgm:prSet phldrT="[Text]"/>
@@ -2660,10 +2811,24 @@
     <dgm:pt modelId="{A15418C6-AACB-45C4-82C9-6EEAB6BC9AD2}" type="parTrans" cxnId="{43ED6747-9745-4AEC-932F-015864BAAA4B}">
       <dgm:prSet/>
       <dgm:spPr/>
+      <dgm:t>
+        <a:bodyPr/>
+        <a:lstStyle/>
+        <a:p>
+          <a:endParaRPr lang="en-US"/>
+        </a:p>
+      </dgm:t>
     </dgm:pt>
     <dgm:pt modelId="{02FE6E80-3BB1-4112-817D-FFE07F685D4A}" type="sibTrans" cxnId="{43ED6747-9745-4AEC-932F-015864BAAA4B}">
       <dgm:prSet/>
       <dgm:spPr/>
+      <dgm:t>
+        <a:bodyPr/>
+        <a:lstStyle/>
+        <a:p>
+          <a:endParaRPr lang="en-US"/>
+        </a:p>
+      </dgm:t>
     </dgm:pt>
     <dgm:pt modelId="{486F8386-192A-4D19-9242-2ECC715A2920}">
       <dgm:prSet phldrT="[Text]"/>
@@ -2695,10 +2860,24 @@
     <dgm:pt modelId="{D97AED1F-900F-4796-946C-A77370866196}" type="parTrans" cxnId="{129995DF-60F2-4463-8918-5D5A253C8417}">
       <dgm:prSet/>
       <dgm:spPr/>
+      <dgm:t>
+        <a:bodyPr/>
+        <a:lstStyle/>
+        <a:p>
+          <a:endParaRPr lang="en-US"/>
+        </a:p>
+      </dgm:t>
     </dgm:pt>
     <dgm:pt modelId="{4F9AE1BE-0400-436C-9D8C-68A1CE80CB58}" type="sibTrans" cxnId="{129995DF-60F2-4463-8918-5D5A253C8417}">
       <dgm:prSet/>
       <dgm:spPr/>
+      <dgm:t>
+        <a:bodyPr/>
+        <a:lstStyle/>
+        <a:p>
+          <a:endParaRPr lang="en-US"/>
+        </a:p>
+      </dgm:t>
     </dgm:pt>
     <dgm:pt modelId="{743BB7F3-A05A-49E2-8352-67E8995A6DE5}">
       <dgm:prSet phldrT="[Text]"/>
@@ -2725,10 +2904,24 @@
     <dgm:pt modelId="{BAE47D5B-722F-4F35-AAB0-C08AB207C98E}" type="parTrans" cxnId="{0A251547-75AD-4EC7-B46B-D7EE909CF811}">
       <dgm:prSet/>
       <dgm:spPr/>
+      <dgm:t>
+        <a:bodyPr/>
+        <a:lstStyle/>
+        <a:p>
+          <a:endParaRPr lang="en-US"/>
+        </a:p>
+      </dgm:t>
     </dgm:pt>
     <dgm:pt modelId="{EA05BB2D-B1EF-4C04-8A2E-01FD52B63593}" type="sibTrans" cxnId="{0A251547-75AD-4EC7-B46B-D7EE909CF811}">
       <dgm:prSet/>
       <dgm:spPr/>
+      <dgm:t>
+        <a:bodyPr/>
+        <a:lstStyle/>
+        <a:p>
+          <a:endParaRPr lang="en-US"/>
+        </a:p>
+      </dgm:t>
     </dgm:pt>
     <dgm:pt modelId="{5D85A349-16C5-4D47-B7B5-2EC1073D2661}">
       <dgm:prSet phldrT="[Text]"/>
@@ -2755,10 +2948,24 @@
     <dgm:pt modelId="{94A7A624-8812-4345-B05A-7BEDFCD5C156}" type="parTrans" cxnId="{421AFE2F-F0E0-44B8-AF49-E7C71B40EBDF}">
       <dgm:prSet/>
       <dgm:spPr/>
+      <dgm:t>
+        <a:bodyPr/>
+        <a:lstStyle/>
+        <a:p>
+          <a:endParaRPr lang="en-US"/>
+        </a:p>
+      </dgm:t>
     </dgm:pt>
     <dgm:pt modelId="{C4112652-278C-4FBE-A3A5-1CDEE1E544E2}" type="sibTrans" cxnId="{421AFE2F-F0E0-44B8-AF49-E7C71B40EBDF}">
       <dgm:prSet/>
       <dgm:spPr/>
+      <dgm:t>
+        <a:bodyPr/>
+        <a:lstStyle/>
+        <a:p>
+          <a:endParaRPr lang="en-US"/>
+        </a:p>
+      </dgm:t>
     </dgm:pt>
     <dgm:pt modelId="{30ED3195-AB5B-4DF3-874A-84A6A0E02DC2}">
       <dgm:prSet phldrT="[Text]"/>
@@ -2785,10 +2992,24 @@
     <dgm:pt modelId="{FB26C958-7AF9-40F5-BB91-D7FC150C4B37}" type="parTrans" cxnId="{3C114156-18FC-4C2C-B44D-AC33F42E22A4}">
       <dgm:prSet/>
       <dgm:spPr/>
+      <dgm:t>
+        <a:bodyPr/>
+        <a:lstStyle/>
+        <a:p>
+          <a:endParaRPr lang="en-US"/>
+        </a:p>
+      </dgm:t>
     </dgm:pt>
     <dgm:pt modelId="{61A9F543-9FF1-471A-A302-BA5D4E378A2E}" type="sibTrans" cxnId="{3C114156-18FC-4C2C-B44D-AC33F42E22A4}">
       <dgm:prSet/>
       <dgm:spPr/>
+      <dgm:t>
+        <a:bodyPr/>
+        <a:lstStyle/>
+        <a:p>
+          <a:endParaRPr lang="en-US"/>
+        </a:p>
+      </dgm:t>
     </dgm:pt>
     <dgm:pt modelId="{DE3F77CF-6A8C-4783-A2CE-00E88C4199CB}" type="pres">
       <dgm:prSet presAssocID="{CF9FC193-7A05-4631-B681-B56EAB543D38}" presName="Name0" presStyleCnt="0">
@@ -2950,8 +3171,8 @@
       </dsp:nvSpPr>
       <dsp:spPr>
         <a:xfrm rot="5400000">
-          <a:off x="6395051" y="-2741862"/>
-          <a:ext cx="682056" cy="6339840"/>
+          <a:off x="6439438" y="-2734441"/>
+          <a:ext cx="754216" cy="6415573"/>
         </a:xfrm>
         <a:prstGeom prst="round2SameRect">
           <a:avLst/>
@@ -2999,7 +3220,7 @@
         </a:bodyPr>
         <a:lstStyle/>
         <a:p>
-          <a:pPr marL="228600" lvl="1" indent="-228600" algn="l" defTabSz="889000">
+          <a:pPr marL="171450" lvl="1" indent="-171450" algn="l" defTabSz="711200">
             <a:lnSpc>
               <a:spcPct val="90000"/>
             </a:lnSpc>
@@ -3012,18 +3233,18 @@
             <a:buChar char="•"/>
           </a:pPr>
           <a:r>
-            <a:rPr lang="en-US" sz="2000" kern="1200" dirty="0">
+            <a:rPr lang="en-US" sz="1600" kern="1200" dirty="0">
               <a:latin typeface="Tahoma" panose="020B0604030504040204" pitchFamily="34" charset="0"/>
               <a:ea typeface="Tahoma" panose="020B0604030504040204" pitchFamily="34" charset="0"/>
               <a:cs typeface="Tahoma" panose="020B0604030504040204" pitchFamily="34" charset="0"/>
             </a:rPr>
-            <a:t>All San Diego County children may not have equal opportunity to quality primary education</a:t>
+            <a:t>All San Diego County children may not have equal opportunity to quality primary education based on the population statistics in their neighborhoods. </a:t>
           </a:r>
         </a:p>
       </dsp:txBody>
       <dsp:txXfrm rot="-5400000">
-        <a:off x="3566160" y="120324"/>
-        <a:ext cx="6306545" cy="615466"/>
+        <a:off x="3608760" y="133055"/>
+        <a:ext cx="6378755" cy="680580"/>
       </dsp:txXfrm>
     </dsp:sp>
     <dsp:sp modelId="{3230722F-B757-4673-BD2F-9D4BAB5CEE8D}">
@@ -3033,8 +3254,8 @@
       </dsp:nvSpPr>
       <dsp:spPr>
         <a:xfrm>
-          <a:off x="0" y="1772"/>
-          <a:ext cx="3566160" cy="852570"/>
+          <a:off x="0" y="1960"/>
+          <a:ext cx="3608760" cy="942771"/>
         </a:xfrm>
         <a:prstGeom prst="roundRect">
           <a:avLst/>
@@ -3075,12 +3296,12 @@
         </a:fontRef>
       </dsp:style>
       <dsp:txBody>
-        <a:bodyPr spcFirstLastPara="0" vert="horz" wrap="square" lIns="76200" tIns="38100" rIns="76200" bIns="38100" numCol="1" spcCol="1270" anchor="ctr" anchorCtr="0">
+        <a:bodyPr spcFirstLastPara="0" vert="horz" wrap="square" lIns="68580" tIns="34290" rIns="68580" bIns="34290" numCol="1" spcCol="1270" anchor="ctr" anchorCtr="0">
           <a:noAutofit/>
         </a:bodyPr>
         <a:lstStyle/>
         <a:p>
-          <a:pPr marL="0" lvl="0" indent="0" algn="ctr" defTabSz="889000">
+          <a:pPr marL="0" lvl="0" indent="0" algn="ctr" defTabSz="800100">
             <a:lnSpc>
               <a:spcPct val="90000"/>
             </a:lnSpc>
@@ -3093,7 +3314,7 @@
             <a:buNone/>
           </a:pPr>
           <a:r>
-            <a:rPr lang="en-US" sz="2000" kern="1200" dirty="0">
+            <a:rPr lang="en-US" sz="1800" kern="1200" dirty="0">
               <a:solidFill>
                 <a:schemeClr val="tx1"/>
               </a:solidFill>
@@ -3101,13 +3322,13 @@
               <a:ea typeface="Tahoma" panose="020B0604030504040204" pitchFamily="34" charset="0"/>
               <a:cs typeface="Tahoma" panose="020B0604030504040204" pitchFamily="34" charset="0"/>
             </a:rPr>
-            <a:t>What is the problem?</a:t>
+            <a:t>What are we trying to predict and answer with the machine learning model?</a:t>
           </a:r>
         </a:p>
       </dsp:txBody>
       <dsp:txXfrm>
-        <a:off x="41619" y="43391"/>
-        <a:ext cx="3482922" cy="769332"/>
+        <a:off x="46022" y="47982"/>
+        <a:ext cx="3516716" cy="850727"/>
       </dsp:txXfrm>
     </dsp:sp>
     <dsp:sp modelId="{329ECF1A-78BE-41CB-B252-8011825B67CD}">
@@ -3117,8 +3338,8 @@
       </dsp:nvSpPr>
       <dsp:spPr>
         <a:xfrm rot="5400000">
-          <a:off x="6395051" y="-1846663"/>
-          <a:ext cx="682056" cy="6339840"/>
+          <a:off x="6439438" y="-1744531"/>
+          <a:ext cx="754216" cy="6415573"/>
         </a:xfrm>
         <a:prstGeom prst="round2SameRect">
           <a:avLst/>
@@ -3166,7 +3387,7 @@
         </a:bodyPr>
         <a:lstStyle/>
         <a:p>
-          <a:pPr marL="228600" lvl="1" indent="-228600" algn="l" defTabSz="889000">
+          <a:pPr marL="171450" lvl="1" indent="-171450" algn="l" defTabSz="711200">
             <a:lnSpc>
               <a:spcPct val="90000"/>
             </a:lnSpc>
@@ -3179,18 +3400,34 @@
             <a:buChar char="•"/>
           </a:pPr>
           <a:r>
-            <a:rPr lang="en-US" sz="2000" kern="1200" dirty="0">
+            <a:rPr lang="en-US" sz="1600" kern="1200" dirty="0">
               <a:latin typeface="Tahoma" panose="020B0604030504040204" pitchFamily="34" charset="0"/>
               <a:ea typeface="Tahoma" panose="020B0604030504040204" pitchFamily="34" charset="0"/>
               <a:cs typeface="Tahoma" panose="020B0604030504040204" pitchFamily="34" charset="0"/>
             </a:rPr>
-            <a:t>We intend to answer this question through data analysis &amp; visualization</a:t>
+            <a:t>We used the XXX model to show how crime statistics, median salary, post secondary education…</a:t>
+          </a:r>
+          <a:r>
+            <a:rPr lang="en-US" sz="1600" kern="1200">
+              <a:latin typeface="Tahoma" panose="020B0604030504040204" pitchFamily="34" charset="0"/>
+              <a:ea typeface="Tahoma" panose="020B0604030504040204" pitchFamily="34" charset="0"/>
+              <a:cs typeface="Tahoma" panose="020B0604030504040204" pitchFamily="34" charset="0"/>
+            </a:rPr>
+            <a:t>may affect </a:t>
+          </a:r>
+          <a:r>
+            <a:rPr lang="en-US" sz="1600" kern="1200" dirty="0">
+              <a:latin typeface="Tahoma" panose="020B0604030504040204" pitchFamily="34" charset="0"/>
+              <a:ea typeface="Tahoma" panose="020B0604030504040204" pitchFamily="34" charset="0"/>
+              <a:cs typeface="Tahoma" panose="020B0604030504040204" pitchFamily="34" charset="0"/>
+            </a:rPr>
+            <a:t>a school’s rating.</a:t>
           </a:r>
         </a:p>
       </dsp:txBody>
       <dsp:txXfrm rot="-5400000">
-        <a:off x="3566160" y="1015523"/>
-        <a:ext cx="6306545" cy="615466"/>
+        <a:off x="3608760" y="1122965"/>
+        <a:ext cx="6378755" cy="680580"/>
       </dsp:txXfrm>
     </dsp:sp>
     <dsp:sp modelId="{8A3FE5E4-2689-4041-B2C5-C63BC276A3EF}">
@@ -3200,8 +3437,8 @@
       </dsp:nvSpPr>
       <dsp:spPr>
         <a:xfrm>
-          <a:off x="0" y="896971"/>
-          <a:ext cx="3566160" cy="852570"/>
+          <a:off x="0" y="991869"/>
+          <a:ext cx="3608760" cy="942771"/>
         </a:xfrm>
         <a:prstGeom prst="roundRect">
           <a:avLst/>
@@ -3242,12 +3479,12 @@
         </a:fontRef>
       </dsp:style>
       <dsp:txBody>
-        <a:bodyPr spcFirstLastPara="0" vert="horz" wrap="square" lIns="76200" tIns="38100" rIns="76200" bIns="38100" numCol="1" spcCol="1270" anchor="ctr" anchorCtr="0">
+        <a:bodyPr spcFirstLastPara="0" vert="horz" wrap="square" lIns="68580" tIns="34290" rIns="68580" bIns="34290" numCol="1" spcCol="1270" anchor="ctr" anchorCtr="0">
           <a:noAutofit/>
         </a:bodyPr>
         <a:lstStyle/>
         <a:p>
-          <a:pPr marL="0" lvl="0" indent="0" algn="ctr" defTabSz="889000">
+          <a:pPr marL="0" lvl="0" indent="0" algn="ctr" defTabSz="800100">
             <a:lnSpc>
               <a:spcPct val="90000"/>
             </a:lnSpc>
@@ -3260,7 +3497,7 @@
             <a:buNone/>
           </a:pPr>
           <a:r>
-            <a:rPr lang="en-US" sz="2000" kern="1200" dirty="0">
+            <a:rPr lang="en-US" sz="1800" kern="1200" dirty="0">
               <a:solidFill>
                 <a:schemeClr val="tx1"/>
               </a:solidFill>
@@ -3268,13 +3505,13 @@
               <a:ea typeface="Tahoma" panose="020B0604030504040204" pitchFamily="34" charset="0"/>
               <a:cs typeface="Tahoma" panose="020B0604030504040204" pitchFamily="34" charset="0"/>
             </a:rPr>
-            <a:t>Who has this problem?</a:t>
+            <a:t>What machine learning model was used?</a:t>
           </a:r>
         </a:p>
       </dsp:txBody>
       <dsp:txXfrm>
-        <a:off x="41619" y="938590"/>
-        <a:ext cx="3482922" cy="769332"/>
+        <a:off x="46022" y="1037891"/>
+        <a:ext cx="3516716" cy="850727"/>
       </dsp:txXfrm>
     </dsp:sp>
     <dsp:sp modelId="{A66EBD3D-E7C5-421C-B8B5-728648057DDC}">
@@ -3284,8 +3521,8 @@
       </dsp:nvSpPr>
       <dsp:spPr>
         <a:xfrm rot="5400000">
-          <a:off x="6395051" y="-951464"/>
-          <a:ext cx="682056" cy="6339840"/>
+          <a:off x="6439438" y="-754622"/>
+          <a:ext cx="754216" cy="6415573"/>
         </a:xfrm>
         <a:prstGeom prst="round2SameRect">
           <a:avLst/>
@@ -3333,7 +3570,7 @@
         </a:bodyPr>
         <a:lstStyle/>
         <a:p>
-          <a:pPr marL="228600" lvl="1" indent="-228600" algn="l" defTabSz="889000">
+          <a:pPr marL="114300" lvl="1" indent="-114300" algn="l" defTabSz="622300">
             <a:lnSpc>
               <a:spcPct val="90000"/>
             </a:lnSpc>
@@ -3346,18 +3583,18 @@
             <a:buChar char="•"/>
           </a:pPr>
           <a:r>
-            <a:rPr lang="en-US" sz="2000" kern="1200" dirty="0">
+            <a:rPr lang="en-US" sz="1400" kern="1200" dirty="0">
               <a:latin typeface="Tahoma" panose="020B0604030504040204" pitchFamily="34" charset="0"/>
               <a:ea typeface="Tahoma" panose="020B0604030504040204" pitchFamily="34" charset="0"/>
               <a:cs typeface="Tahoma" panose="020B0604030504040204" pitchFamily="34" charset="0"/>
             </a:rPr>
-            <a:t>Primary educational outcomes are strong indicators of future success</a:t>
+            <a:t>If the model is accurate the model could potentially be used in other regions or for education service agencies and districts to further examine what additional resources or funding may be needed. </a:t>
           </a:r>
         </a:p>
       </dsp:txBody>
       <dsp:txXfrm rot="-5400000">
-        <a:off x="3566160" y="1910722"/>
-        <a:ext cx="6306545" cy="615466"/>
+        <a:off x="3608760" y="2112874"/>
+        <a:ext cx="6378755" cy="680580"/>
       </dsp:txXfrm>
     </dsp:sp>
     <dsp:sp modelId="{1C763A21-352A-41D1-A2E2-E305DABA275D}">
@@ -3367,8 +3604,8 @@
       </dsp:nvSpPr>
       <dsp:spPr>
         <a:xfrm>
-          <a:off x="0" y="1792170"/>
-          <a:ext cx="3566160" cy="852570"/>
+          <a:off x="0" y="1981779"/>
+          <a:ext cx="3608760" cy="942771"/>
         </a:xfrm>
         <a:prstGeom prst="roundRect">
           <a:avLst/>
@@ -3409,12 +3646,12 @@
         </a:fontRef>
       </dsp:style>
       <dsp:txBody>
-        <a:bodyPr spcFirstLastPara="0" vert="horz" wrap="square" lIns="76200" tIns="38100" rIns="76200" bIns="38100" numCol="1" spcCol="1270" anchor="ctr" anchorCtr="0">
+        <a:bodyPr spcFirstLastPara="0" vert="horz" wrap="square" lIns="68580" tIns="34290" rIns="68580" bIns="34290" numCol="1" spcCol="1270" anchor="ctr" anchorCtr="0">
           <a:noAutofit/>
         </a:bodyPr>
         <a:lstStyle/>
         <a:p>
-          <a:pPr marL="0" lvl="0" indent="0" algn="ctr" defTabSz="889000">
+          <a:pPr marL="0" lvl="0" indent="0" algn="ctr" defTabSz="800100">
             <a:lnSpc>
               <a:spcPct val="90000"/>
             </a:lnSpc>
@@ -3427,7 +3664,7 @@
             <a:buNone/>
           </a:pPr>
           <a:r>
-            <a:rPr lang="en-US" sz="2000" kern="1200" dirty="0">
+            <a:rPr lang="en-US" sz="1800" kern="1200" dirty="0">
               <a:solidFill>
                 <a:schemeClr val="tx1"/>
               </a:solidFill>
@@ -3435,13 +3672,13 @@
               <a:ea typeface="Tahoma" panose="020B0604030504040204" pitchFamily="34" charset="0"/>
               <a:cs typeface="Tahoma" panose="020B0604030504040204" pitchFamily="34" charset="0"/>
             </a:rPr>
-            <a:t>Why should this problem be solved?</a:t>
+            <a:t>What did we find and how could the model be used?</a:t>
           </a:r>
         </a:p>
       </dsp:txBody>
       <dsp:txXfrm>
-        <a:off x="41619" y="1833789"/>
-        <a:ext cx="3482922" cy="769332"/>
+        <a:off x="46022" y="2027801"/>
+        <a:ext cx="3516716" cy="850727"/>
       </dsp:txXfrm>
     </dsp:sp>
     <dsp:sp modelId="{95E0557D-F0A1-4F38-8083-55DE7503164F}">
@@ -3451,8 +3688,8 @@
       </dsp:nvSpPr>
       <dsp:spPr>
         <a:xfrm rot="5400000">
-          <a:off x="6395051" y="-56265"/>
-          <a:ext cx="682056" cy="6339840"/>
+          <a:off x="6439438" y="235287"/>
+          <a:ext cx="754216" cy="6415573"/>
         </a:xfrm>
         <a:prstGeom prst="round2SameRect">
           <a:avLst/>
@@ -3518,13 +3755,13 @@
               <a:ea typeface="Tahoma" panose="020B0604030504040204" pitchFamily="34" charset="0"/>
               <a:cs typeface="Tahoma" panose="020B0604030504040204" pitchFamily="34" charset="0"/>
             </a:rPr>
-            <a:t>If we can detect distinct patterns that show different educational outcomes for different population groups in San Diego County</a:t>
+            <a:t>If we can find an accurate model that predicts school ratings against our test data set.</a:t>
           </a:r>
         </a:p>
       </dsp:txBody>
       <dsp:txXfrm rot="-5400000">
-        <a:off x="3566160" y="2805921"/>
-        <a:ext cx="6306545" cy="615466"/>
+        <a:off x="3608760" y="3102783"/>
+        <a:ext cx="6378755" cy="680580"/>
       </dsp:txXfrm>
     </dsp:sp>
     <dsp:sp modelId="{B9324B26-5FF5-4FF7-9073-66103CBE8481}">
@@ -3534,8 +3771,8 @@
       </dsp:nvSpPr>
       <dsp:spPr>
         <a:xfrm>
-          <a:off x="0" y="2687369"/>
-          <a:ext cx="3566160" cy="852570"/>
+          <a:off x="0" y="2971688"/>
+          <a:ext cx="3608760" cy="942771"/>
         </a:xfrm>
         <a:prstGeom prst="roundRect">
           <a:avLst/>
@@ -3576,12 +3813,12 @@
         </a:fontRef>
       </dsp:style>
       <dsp:txBody>
-        <a:bodyPr spcFirstLastPara="0" vert="horz" wrap="square" lIns="76200" tIns="38100" rIns="76200" bIns="38100" numCol="1" spcCol="1270" anchor="ctr" anchorCtr="0">
+        <a:bodyPr spcFirstLastPara="0" vert="horz" wrap="square" lIns="68580" tIns="34290" rIns="68580" bIns="34290" numCol="1" spcCol="1270" anchor="ctr" anchorCtr="0">
           <a:noAutofit/>
         </a:bodyPr>
         <a:lstStyle/>
         <a:p>
-          <a:pPr marL="0" lvl="0" indent="0" algn="ctr" defTabSz="889000">
+          <a:pPr marL="0" lvl="0" indent="0" algn="ctr" defTabSz="800100">
             <a:lnSpc>
               <a:spcPct val="90000"/>
             </a:lnSpc>
@@ -3594,7 +3831,7 @@
             <a:buNone/>
           </a:pPr>
           <a:r>
-            <a:rPr lang="en-US" sz="2000" kern="1200" dirty="0">
+            <a:rPr lang="en-US" sz="1800" kern="1200" dirty="0">
               <a:solidFill>
                 <a:schemeClr val="tx1"/>
               </a:solidFill>
@@ -3607,8 +3844,8 @@
         </a:p>
       </dsp:txBody>
       <dsp:txXfrm>
-        <a:off x="41619" y="2728988"/>
-        <a:ext cx="3482922" cy="769332"/>
+        <a:off x="46022" y="3017710"/>
+        <a:ext cx="3516716" cy="850727"/>
       </dsp:txXfrm>
     </dsp:sp>
   </dsp:spTree>
@@ -7053,7 +7290,7 @@
           <a:p>
             <a:fld id="{2B85766F-5EC0-4797-B4D1-777FCB005B11}" type="datetimeFigureOut">
               <a:rPr lang="en-US" smtClean="0"/>
-              <a:t>9/13/2021</a:t>
+              <a:t>10/27/2021</a:t>
             </a:fld>
             <a:endParaRPr lang="en-US" dirty="0"/>
           </a:p>
@@ -7230,7 +7467,7 @@
           <a:p>
             <a:fld id="{B2B4B5EC-152C-4627-80C0-63B10D5574EF}" type="datetimeFigureOut">
               <a:rPr lang="en-US" smtClean="0"/>
-              <a:t>9/13/2021</a:t>
+              <a:t>10/27/2021</a:t>
             </a:fld>
             <a:endParaRPr lang="en-US" dirty="0"/>
           </a:p>
@@ -11779,7 +12016,7 @@
           <a:p>
             <a:fld id="{48A87A34-81AB-432B-8DAE-1953F412C126}" type="datetimeFigureOut">
               <a:rPr lang="en-US" smtClean="0"/>
-              <a:t>9/13/2021</a:t>
+              <a:t>10/27/2021</a:t>
             </a:fld>
             <a:endParaRPr lang="en-US" dirty="0"/>
           </a:p>
@@ -12046,7 +12283,7 @@
           <a:p>
             <a:fld id="{48A87A34-81AB-432B-8DAE-1953F412C126}" type="datetimeFigureOut">
               <a:rPr lang="en-US" smtClean="0"/>
-              <a:t>9/13/2021</a:t>
+              <a:t>10/27/2021</a:t>
             </a:fld>
             <a:endParaRPr lang="en-US" dirty="0"/>
           </a:p>
@@ -12242,7 +12479,7 @@
           <a:p>
             <a:fld id="{48A87A34-81AB-432B-8DAE-1953F412C126}" type="datetimeFigureOut">
               <a:rPr lang="en-US" smtClean="0"/>
-              <a:t>9/13/2021</a:t>
+              <a:t>10/27/2021</a:t>
             </a:fld>
             <a:endParaRPr lang="en-US" dirty="0"/>
           </a:p>
@@ -12505,7 +12742,7 @@
           <a:p>
             <a:fld id="{48A87A34-81AB-432B-8DAE-1953F412C126}" type="datetimeFigureOut">
               <a:rPr lang="en-US" smtClean="0"/>
-              <a:t>9/13/2021</a:t>
+              <a:t>10/27/2021</a:t>
             </a:fld>
             <a:endParaRPr lang="en-US" dirty="0"/>
           </a:p>
@@ -12939,7 +13176,7 @@
           <a:p>
             <a:fld id="{48A87A34-81AB-432B-8DAE-1953F412C126}" type="datetimeFigureOut">
               <a:rPr lang="en-US" smtClean="0"/>
-              <a:t>9/13/2021</a:t>
+              <a:t>10/27/2021</a:t>
             </a:fld>
             <a:endParaRPr lang="en-US" dirty="0"/>
           </a:p>
@@ -13485,7 +13722,7 @@
           <a:p>
             <a:fld id="{48A87A34-81AB-432B-8DAE-1953F412C126}" type="datetimeFigureOut">
               <a:rPr lang="en-US" smtClean="0"/>
-              <a:t>9/13/2021</a:t>
+              <a:t>10/27/2021</a:t>
             </a:fld>
             <a:endParaRPr lang="en-US" dirty="0"/>
           </a:p>
@@ -14205,7 +14442,7 @@
           <a:p>
             <a:fld id="{48A87A34-81AB-432B-8DAE-1953F412C126}" type="datetimeFigureOut">
               <a:rPr lang="en-US" smtClean="0"/>
-              <a:t>9/13/2021</a:t>
+              <a:t>10/27/2021</a:t>
             </a:fld>
             <a:endParaRPr lang="en-US" dirty="0"/>
           </a:p>
@@ -14375,7 +14612,7 @@
           <a:p>
             <a:fld id="{48A87A34-81AB-432B-8DAE-1953F412C126}" type="datetimeFigureOut">
               <a:rPr lang="en-US" smtClean="0"/>
-              <a:t>9/13/2021</a:t>
+              <a:t>10/27/2021</a:t>
             </a:fld>
             <a:endParaRPr lang="en-US" dirty="0"/>
           </a:p>
@@ -14555,7 +14792,7 @@
           <a:p>
             <a:fld id="{48A87A34-81AB-432B-8DAE-1953F412C126}" type="datetimeFigureOut">
               <a:rPr lang="en-US" smtClean="0"/>
-              <a:t>9/13/2021</a:t>
+              <a:t>10/27/2021</a:t>
             </a:fld>
             <a:endParaRPr lang="en-US" dirty="0"/>
           </a:p>
@@ -14725,7 +14962,7 @@
           <a:p>
             <a:fld id="{48A87A34-81AB-432B-8DAE-1953F412C126}" type="datetimeFigureOut">
               <a:rPr lang="en-US" smtClean="0"/>
-              <a:t>9/13/2021</a:t>
+              <a:t>10/27/2021</a:t>
             </a:fld>
             <a:endParaRPr lang="en-US" dirty="0"/>
           </a:p>
@@ -14975,7 +15212,7 @@
           <a:p>
             <a:fld id="{48A87A34-81AB-432B-8DAE-1953F412C126}" type="datetimeFigureOut">
               <a:rPr lang="en-US" smtClean="0"/>
-              <a:t>9/13/2021</a:t>
+              <a:t>10/27/2021</a:t>
             </a:fld>
             <a:endParaRPr lang="en-US" dirty="0"/>
           </a:p>
@@ -15207,7 +15444,7 @@
           <a:p>
             <a:fld id="{48A87A34-81AB-432B-8DAE-1953F412C126}" type="datetimeFigureOut">
               <a:rPr lang="en-US" smtClean="0"/>
-              <a:t>9/13/2021</a:t>
+              <a:t>10/27/2021</a:t>
             </a:fld>
             <a:endParaRPr lang="en-US" dirty="0"/>
           </a:p>
@@ -15588,7 +15825,7 @@
           <a:p>
             <a:fld id="{48A87A34-81AB-432B-8DAE-1953F412C126}" type="datetimeFigureOut">
               <a:rPr lang="en-US" smtClean="0"/>
-              <a:t>9/13/2021</a:t>
+              <a:t>10/27/2021</a:t>
             </a:fld>
             <a:endParaRPr lang="en-US" dirty="0"/>
           </a:p>
@@ -15706,7 +15943,7 @@
           <a:p>
             <a:fld id="{48A87A34-81AB-432B-8DAE-1953F412C126}" type="datetimeFigureOut">
               <a:rPr lang="en-US" smtClean="0"/>
-              <a:t>9/13/2021</a:t>
+              <a:t>10/27/2021</a:t>
             </a:fld>
             <a:endParaRPr lang="en-US" dirty="0"/>
           </a:p>
@@ -15801,7 +16038,7 @@
           <a:p>
             <a:fld id="{48A87A34-81AB-432B-8DAE-1953F412C126}" type="datetimeFigureOut">
               <a:rPr lang="en-US" smtClean="0"/>
-              <a:t>9/13/2021</a:t>
+              <a:t>10/27/2021</a:t>
             </a:fld>
             <a:endParaRPr lang="en-US" dirty="0"/>
           </a:p>
@@ -16050,7 +16287,7 @@
           <a:p>
             <a:fld id="{48A87A34-81AB-432B-8DAE-1953F412C126}" type="datetimeFigureOut">
               <a:rPr lang="en-US" smtClean="0"/>
-              <a:t>9/13/2021</a:t>
+              <a:t>10/27/2021</a:t>
             </a:fld>
             <a:endParaRPr lang="en-US" dirty="0"/>
           </a:p>
@@ -16330,7 +16567,7 @@
           <a:p>
             <a:fld id="{48A87A34-81AB-432B-8DAE-1953F412C126}" type="datetimeFigureOut">
               <a:rPr lang="en-US" smtClean="0"/>
-              <a:t>9/13/2021</a:t>
+              <a:t>10/27/2021</a:t>
             </a:fld>
             <a:endParaRPr lang="en-US" dirty="0"/>
           </a:p>
@@ -19398,7 +19635,7 @@
             <a:fld id="{48A87A34-81AB-432B-8DAE-1953F412C126}" type="datetimeFigureOut">
               <a:rPr lang="en-US" smtClean="0"/>
               <a:pPr/>
-              <a:t>9/13/2021</a:t>
+              <a:t>10/27/2021</a:t>
             </a:fld>
             <a:endParaRPr lang="en-US" dirty="0"/>
           </a:p>
@@ -20121,14 +20358,14 @@
             <p:ph idx="1"/>
             <p:extLst>
               <p:ext uri="{D42A27DB-BD31-4B8C-83A1-F6EECF244321}">
-                <p14:modId xmlns:p14="http://schemas.microsoft.com/office/powerpoint/2010/main" val="3030752168"/>
+                <p14:modId xmlns:p14="http://schemas.microsoft.com/office/powerpoint/2010/main" val="540127993"/>
               </p:ext>
             </p:extLst>
           </p:nvPr>
         </p:nvGraphicFramePr>
         <p:xfrm>
           <a:off x="1141413" y="2249488"/>
-          <a:ext cx="9906000" cy="3541712"/>
+          <a:ext cx="10024334" cy="3916420"/>
         </p:xfrm>
         <a:graphic>
           <a:graphicData uri="http://schemas.openxmlformats.org/drawingml/2006/diagram">

</xml_diff>